<commit_message>
test program produces slide layout
</commit_message>
<xml_diff>
--- a/src/testing/create_slides/test.pptx
+++ b/src/testing/create_slides/test.pptx
@@ -11,13 +11,8 @@
     <p:sldId id="259" r:id="rId10"/>
     <p:sldId id="260" r:id="rId11"/>
     <p:sldId id="261" r:id="rId12"/>
-    <p:sldId id="262" r:id="rId13"/>
-    <p:sldId id="263" r:id="rId14"/>
-    <p:sldId id="264" r:id="rId15"/>
-    <p:sldId id="265" r:id="rId16"/>
-    <p:sldId id="266" r:id="rId17"/>
   </p:sldIdLst>
-  <p:sldSz cx="9144000" cy="6858000" type="screen4x3"/>
+  <p:sldSz cx="14630400" cy="8229600" type="screen4x3"/>
   <p:notesSz cx="6858000" cy="9144000"/>
   <p:defaultTextStyle>
     <a:defPPr>
@@ -3106,291 +3101,81 @@
         <p:nvPr/>
       </p:nvGrpSpPr>
       <p:grpSpPr/>
-      <p:sp>
-        <p:nvSpPr>
-          <p:cNvPr id="4" name="Rectangle 3"/>
-          <p:cNvSpPr/>
+      <p:pic>
+        <p:nvPicPr>
+          <p:cNvPr id="2" name="Picture 1" descr="text_plate.png"/>
+          <p:cNvPicPr>
+            <a:picLocks noChangeAspect="1"/>
+          </p:cNvPicPr>
           <p:nvPr/>
-        </p:nvSpPr>
+        </p:nvPicPr>
+        <p:blipFill>
+          <a:blip r:embed="rId2"/>
+          <a:stretch>
+            <a:fillRect/>
+          </a:stretch>
+        </p:blipFill>
         <p:spPr>
           <a:xfrm>
-            <a:off x="0" y="2743200"/>
-            <a:ext cx="9144000" cy="2286000"/>
+            <a:off x="1371600" y="5943600"/>
+            <a:ext cx="13258800" cy="2286000"/>
           </a:xfrm>
           <a:prstGeom prst="rect">
             <a:avLst/>
           </a:prstGeom>
         </p:spPr>
-        <p:style>
-          <a:lnRef idx="1">
-            <a:schemeClr val="accent1"/>
-          </a:lnRef>
-          <a:fillRef idx="3">
-            <a:schemeClr val="accent1"/>
-          </a:fillRef>
-          <a:effectRef idx="2">
-            <a:schemeClr val="accent1"/>
-          </a:effectRef>
-          <a:fontRef idx="minor">
-            <a:schemeClr val="lt1"/>
-          </a:fontRef>
-        </p:style>
-        <p:txBody>
-          <a:bodyPr rtlCol="0" anchor="ctr"/>
-          <a:lstStyle/>
-          <a:p>
-            <a:pPr algn="ctr"/>
-          </a:p>
-        </p:txBody>
-      </p:sp>
-      <p:sp>
-        <p:nvSpPr>
-          <p:cNvPr id="2" name="Title 1"/>
-          <p:cNvSpPr>
-            <a:spLocks noGrp="1"/>
-          </p:cNvSpPr>
-          <p:nvPr>
-            <p:ph type="ctrTitle"/>
-          </p:nvPr>
-        </p:nvSpPr>
-        <p:spPr/>
-        <p:txBody>
-          <a:bodyPr/>
-          <a:lstStyle/>
-          <a:p>
-            <a:r>
-              <a:t>Hello, World! 0</a:t>
-            </a:r>
-          </a:p>
-        </p:txBody>
-      </p:sp>
-      <p:sp>
-        <p:nvSpPr>
-          <p:cNvPr id="3" name="Subtitle 2"/>
-          <p:cNvSpPr>
-            <a:spLocks noGrp="1"/>
-          </p:cNvSpPr>
-          <p:nvPr>
-            <p:ph type="subTitle" idx="1"/>
-          </p:nvPr>
-        </p:nvSpPr>
-        <p:spPr/>
-        <p:txBody>
-          <a:bodyPr/>
-          <a:lstStyle/>
-          <a:p>
-            <a:r>
-              <a:t>python-pptx was here!</a:t>
-            </a:r>
-          </a:p>
-        </p:txBody>
-      </p:sp>
-    </p:spTree>
-  </p:cSld>
-  <p:clrMapOvr>
-    <a:masterClrMapping/>
-  </p:clrMapOvr>
-</p:sld>
-</file>
-
-<file path=ppt/slides/slide10.xml><?xml version="1.0" encoding="utf-8"?>
-<p:sld xmlns:a="http://schemas.openxmlformats.org/drawingml/2006/main" xmlns:p="http://schemas.openxmlformats.org/presentationml/2006/main" xmlns:r="http://schemas.openxmlformats.org/officeDocument/2006/relationships">
-  <p:cSld>
-    <p:bg>
-      <p:bgPr>
-        <a:solidFill>
-          <a:srgbClr val="00FF00"/>
-        </a:solidFill>
-        <a:effectLst/>
-      </p:bgPr>
-    </p:bg>
-    <p:spTree>
-      <p:nvGrpSpPr>
-        <p:cNvPr id="1" name=""/>
-        <p:cNvGrpSpPr/>
-        <p:nvPr/>
-      </p:nvGrpSpPr>
-      <p:grpSpPr/>
-      <p:sp>
-        <p:nvSpPr>
-          <p:cNvPr id="4" name="Rectangle 3"/>
-          <p:cNvSpPr/>
+      </p:pic>
+      <p:pic>
+        <p:nvPicPr>
+          <p:cNvPr id="3" name="Picture 2" descr="CrossFlame_WhiteRed.png"/>
+          <p:cNvPicPr>
+            <a:picLocks noChangeAspect="1"/>
+          </p:cNvPicPr>
           <p:nvPr/>
-        </p:nvSpPr>
+        </p:nvPicPr>
+        <p:blipFill>
+          <a:blip r:embed="rId3"/>
+          <a:stretch>
+            <a:fillRect/>
+          </a:stretch>
+        </p:blipFill>
         <p:spPr>
           <a:xfrm>
-            <a:off x="0" y="2743200"/>
-            <a:ext cx="9144000" cy="2286000"/>
+            <a:off x="-1143000" y="5943600"/>
+            <a:ext cx="3538682" cy="2286000"/>
           </a:xfrm>
           <a:prstGeom prst="rect">
             <a:avLst/>
           </a:prstGeom>
         </p:spPr>
-        <p:style>
-          <a:lnRef idx="1">
-            <a:schemeClr val="accent1"/>
-          </a:lnRef>
-          <a:fillRef idx="3">
-            <a:schemeClr val="accent1"/>
-          </a:fillRef>
-          <a:effectRef idx="2">
-            <a:schemeClr val="accent1"/>
-          </a:effectRef>
-          <a:fontRef idx="minor">
-            <a:schemeClr val="lt1"/>
-          </a:fontRef>
-        </p:style>
-        <p:txBody>
-          <a:bodyPr rtlCol="0" anchor="ctr"/>
-          <a:lstStyle/>
-          <a:p>
-            <a:pPr algn="ctr"/>
-          </a:p>
-        </p:txBody>
-      </p:sp>
-      <p:sp>
-        <p:nvSpPr>
-          <p:cNvPr id="2" name="Title 1"/>
-          <p:cNvSpPr>
-            <a:spLocks noGrp="1"/>
-          </p:cNvSpPr>
-          <p:nvPr>
-            <p:ph type="ctrTitle"/>
-          </p:nvPr>
-        </p:nvSpPr>
-        <p:spPr/>
-        <p:txBody>
-          <a:bodyPr/>
-          <a:lstStyle/>
-          <a:p>
-            <a:r>
-              <a:t>Hello, World! 9</a:t>
-            </a:r>
-          </a:p>
-        </p:txBody>
-      </p:sp>
-      <p:sp>
-        <p:nvSpPr>
-          <p:cNvPr id="3" name="Subtitle 2"/>
-          <p:cNvSpPr>
-            <a:spLocks noGrp="1"/>
-          </p:cNvSpPr>
-          <p:nvPr>
-            <p:ph type="subTitle" idx="1"/>
-          </p:nvPr>
-        </p:nvSpPr>
-        <p:spPr/>
-        <p:txBody>
-          <a:bodyPr/>
-          <a:lstStyle/>
-          <a:p>
-            <a:r>
-              <a:t>python-pptx was here!</a:t>
-            </a:r>
-          </a:p>
-        </p:txBody>
-      </p:sp>
-    </p:spTree>
-  </p:cSld>
-  <p:clrMapOvr>
-    <a:masterClrMapping/>
-  </p:clrMapOvr>
-</p:sld>
-</file>
-
-<file path=ppt/slides/slide11.xml><?xml version="1.0" encoding="utf-8"?>
-<p:sld xmlns:a="http://schemas.openxmlformats.org/drawingml/2006/main" xmlns:p="http://schemas.openxmlformats.org/presentationml/2006/main" xmlns:r="http://schemas.openxmlformats.org/officeDocument/2006/relationships">
-  <p:cSld>
-    <p:bg>
-      <p:bgPr>
-        <a:solidFill>
-          <a:srgbClr val="00FF00"/>
-        </a:solidFill>
-        <a:effectLst/>
-      </p:bgPr>
-    </p:bg>
-    <p:spTree>
-      <p:nvGrpSpPr>
-        <p:cNvPr id="1" name=""/>
-        <p:cNvGrpSpPr/>
-        <p:nvPr/>
-      </p:nvGrpSpPr>
-      <p:grpSpPr/>
-      <p:sp>
-        <p:nvSpPr>
-          <p:cNvPr id="4" name="Rectangle 3"/>
-          <p:cNvSpPr/>
+      </p:pic>
+      <p:sp>
+        <p:nvSpPr>
+          <p:cNvPr id="4" name="TextBox 3"/>
+          <p:cNvSpPr txBox="1"/>
           <p:nvPr/>
         </p:nvSpPr>
         <p:spPr>
           <a:xfrm>
-            <a:off x="0" y="2743200"/>
-            <a:ext cx="9144000" cy="2286000"/>
+            <a:off x="1371600" y="5943600"/>
+            <a:ext cx="13258800" cy="2286000"/>
           </a:xfrm>
           <a:prstGeom prst="rect">
             <a:avLst/>
           </a:prstGeom>
+          <a:noFill/>
         </p:spPr>
-        <p:style>
-          <a:lnRef idx="1">
-            <a:schemeClr val="accent1"/>
-          </a:lnRef>
-          <a:fillRef idx="3">
-            <a:schemeClr val="accent1"/>
-          </a:fillRef>
-          <a:effectRef idx="2">
-            <a:schemeClr val="accent1"/>
-          </a:effectRef>
-          <a:fontRef idx="minor">
-            <a:schemeClr val="lt1"/>
-          </a:fontRef>
-        </p:style>
-        <p:txBody>
-          <a:bodyPr rtlCol="0" anchor="ctr"/>
-          <a:lstStyle/>
-          <a:p>
-            <a:pPr algn="ctr"/>
-          </a:p>
-        </p:txBody>
-      </p:sp>
-      <p:sp>
-        <p:nvSpPr>
-          <p:cNvPr id="2" name="Title 1"/>
-          <p:cNvSpPr>
-            <a:spLocks noGrp="1"/>
-          </p:cNvSpPr>
-          <p:nvPr>
-            <p:ph type="ctrTitle"/>
-          </p:nvPr>
-        </p:nvSpPr>
-        <p:spPr/>
-        <p:txBody>
-          <a:bodyPr/>
-          <a:lstStyle/>
-          <a:p>
-            <a:r>
-              <a:t>Hello, World! 10</a:t>
-            </a:r>
-          </a:p>
-        </p:txBody>
-      </p:sp>
-      <p:sp>
-        <p:nvSpPr>
-          <p:cNvPr id="3" name="Subtitle 2"/>
-          <p:cNvSpPr>
-            <a:spLocks noGrp="1"/>
-          </p:cNvSpPr>
-          <p:nvPr>
-            <p:ph type="subTitle" idx="1"/>
-          </p:nvPr>
-        </p:nvSpPr>
-        <p:spPr/>
-        <p:txBody>
-          <a:bodyPr/>
-          <a:lstStyle/>
-          <a:p>
-            <a:r>
-              <a:t>python-pptx was here!</a:t>
+        <p:txBody>
+          <a:bodyPr wrap="square" anchor="ctr"/>
+          <a:lstStyle/>
+          <a:p>
+            <a:pPr algn="ctr">
+              <a:defRPr sz="2400" b="1">
+                <a:latin typeface="Arial"/>
+              </a:defRPr>
+            </a:pPr>
+            <a:r>
+              <a:t>Lorem ipsum dolor sit amet, consectetur adipiscing elit. Sed do eiusmod tempor incididunt ut labore et dolore magna aliqua. Ut enim ad minim veniam, quis nostrud exercitation ullamco laboris nisi ut aliquip ex ea commodo consequat. Duis aute irure dolor in reprehenderit in voluptate.</a:t>
             </a:r>
           </a:p>
         </p:txBody>
@@ -3421,81 +3206,81 @@
         <p:nvPr/>
       </p:nvGrpSpPr>
       <p:grpSpPr/>
-      <p:sp>
-        <p:nvSpPr>
-          <p:cNvPr id="4" name="Rectangle 3"/>
-          <p:cNvSpPr/>
+      <p:pic>
+        <p:nvPicPr>
+          <p:cNvPr id="2" name="Picture 1" descr="text_plate.png"/>
+          <p:cNvPicPr>
+            <a:picLocks noChangeAspect="1"/>
+          </p:cNvPicPr>
           <p:nvPr/>
-        </p:nvSpPr>
+        </p:nvPicPr>
+        <p:blipFill>
+          <a:blip r:embed="rId2"/>
+          <a:stretch>
+            <a:fillRect/>
+          </a:stretch>
+        </p:blipFill>
         <p:spPr>
           <a:xfrm>
-            <a:off x="0" y="2743200"/>
-            <a:ext cx="9144000" cy="2286000"/>
+            <a:off x="1371600" y="5943600"/>
+            <a:ext cx="13258800" cy="2286000"/>
           </a:xfrm>
           <a:prstGeom prst="rect">
             <a:avLst/>
           </a:prstGeom>
         </p:spPr>
-        <p:style>
-          <a:lnRef idx="1">
-            <a:schemeClr val="accent1"/>
-          </a:lnRef>
-          <a:fillRef idx="3">
-            <a:schemeClr val="accent1"/>
-          </a:fillRef>
-          <a:effectRef idx="2">
-            <a:schemeClr val="accent1"/>
-          </a:effectRef>
-          <a:fontRef idx="minor">
-            <a:schemeClr val="lt1"/>
-          </a:fontRef>
-        </p:style>
-        <p:txBody>
-          <a:bodyPr rtlCol="0" anchor="ctr"/>
-          <a:lstStyle/>
-          <a:p>
-            <a:pPr algn="ctr"/>
-          </a:p>
-        </p:txBody>
-      </p:sp>
-      <p:sp>
-        <p:nvSpPr>
-          <p:cNvPr id="2" name="Title 1"/>
-          <p:cNvSpPr>
-            <a:spLocks noGrp="1"/>
-          </p:cNvSpPr>
-          <p:nvPr>
-            <p:ph type="ctrTitle"/>
-          </p:nvPr>
-        </p:nvSpPr>
-        <p:spPr/>
-        <p:txBody>
-          <a:bodyPr/>
-          <a:lstStyle/>
-          <a:p>
-            <a:r>
-              <a:t>Hello, World! 1</a:t>
-            </a:r>
-          </a:p>
-        </p:txBody>
-      </p:sp>
-      <p:sp>
-        <p:nvSpPr>
-          <p:cNvPr id="3" name="Subtitle 2"/>
-          <p:cNvSpPr>
-            <a:spLocks noGrp="1"/>
-          </p:cNvSpPr>
-          <p:nvPr>
-            <p:ph type="subTitle" idx="1"/>
-          </p:nvPr>
-        </p:nvSpPr>
-        <p:spPr/>
-        <p:txBody>
-          <a:bodyPr/>
-          <a:lstStyle/>
-          <a:p>
-            <a:r>
-              <a:t>python-pptx was here!</a:t>
+      </p:pic>
+      <p:pic>
+        <p:nvPicPr>
+          <p:cNvPr id="3" name="Picture 2" descr="CrossFlame_WhiteRed.png"/>
+          <p:cNvPicPr>
+            <a:picLocks noChangeAspect="1"/>
+          </p:cNvPicPr>
+          <p:nvPr/>
+        </p:nvPicPr>
+        <p:blipFill>
+          <a:blip r:embed="rId3"/>
+          <a:stretch>
+            <a:fillRect/>
+          </a:stretch>
+        </p:blipFill>
+        <p:spPr>
+          <a:xfrm>
+            <a:off x="-1143000" y="5943600"/>
+            <a:ext cx="3538682" cy="2286000"/>
+          </a:xfrm>
+          <a:prstGeom prst="rect">
+            <a:avLst/>
+          </a:prstGeom>
+        </p:spPr>
+      </p:pic>
+      <p:sp>
+        <p:nvSpPr>
+          <p:cNvPr id="4" name="TextBox 3"/>
+          <p:cNvSpPr txBox="1"/>
+          <p:nvPr/>
+        </p:nvSpPr>
+        <p:spPr>
+          <a:xfrm>
+            <a:off x="1371600" y="5943600"/>
+            <a:ext cx="13258800" cy="2286000"/>
+          </a:xfrm>
+          <a:prstGeom prst="rect">
+            <a:avLst/>
+          </a:prstGeom>
+          <a:noFill/>
+        </p:spPr>
+        <p:txBody>
+          <a:bodyPr wrap="square" anchor="ctr"/>
+          <a:lstStyle/>
+          <a:p>
+            <a:pPr algn="ctr">
+              <a:defRPr sz="2400" b="1">
+                <a:latin typeface="Arial"/>
+              </a:defRPr>
+            </a:pPr>
+            <a:r>
+              <a:t>Lorem ipsum dolor sit amet, consectetur adipiscing elit. Sed do eiusmod tempor incididunt ut labore et dolore magna aliqua. Ut enim ad minim veniam, quis nostrud exercitation ullamco laboris nisi ut aliquip ex ea commodo consequat. Duis aute irure dolor in reprehenderit in voluptate.</a:t>
             </a:r>
           </a:p>
         </p:txBody>
@@ -3526,81 +3311,81 @@
         <p:nvPr/>
       </p:nvGrpSpPr>
       <p:grpSpPr/>
-      <p:sp>
-        <p:nvSpPr>
-          <p:cNvPr id="4" name="Rectangle 3"/>
-          <p:cNvSpPr/>
+      <p:pic>
+        <p:nvPicPr>
+          <p:cNvPr id="2" name="Picture 1" descr="text_plate.png"/>
+          <p:cNvPicPr>
+            <a:picLocks noChangeAspect="1"/>
+          </p:cNvPicPr>
           <p:nvPr/>
-        </p:nvSpPr>
+        </p:nvPicPr>
+        <p:blipFill>
+          <a:blip r:embed="rId2"/>
+          <a:stretch>
+            <a:fillRect/>
+          </a:stretch>
+        </p:blipFill>
         <p:spPr>
           <a:xfrm>
-            <a:off x="0" y="2743200"/>
-            <a:ext cx="9144000" cy="2286000"/>
+            <a:off x="1371600" y="5943600"/>
+            <a:ext cx="13258800" cy="2286000"/>
           </a:xfrm>
           <a:prstGeom prst="rect">
             <a:avLst/>
           </a:prstGeom>
         </p:spPr>
-        <p:style>
-          <a:lnRef idx="1">
-            <a:schemeClr val="accent1"/>
-          </a:lnRef>
-          <a:fillRef idx="3">
-            <a:schemeClr val="accent1"/>
-          </a:fillRef>
-          <a:effectRef idx="2">
-            <a:schemeClr val="accent1"/>
-          </a:effectRef>
-          <a:fontRef idx="minor">
-            <a:schemeClr val="lt1"/>
-          </a:fontRef>
-        </p:style>
-        <p:txBody>
-          <a:bodyPr rtlCol="0" anchor="ctr"/>
-          <a:lstStyle/>
-          <a:p>
-            <a:pPr algn="ctr"/>
-          </a:p>
-        </p:txBody>
-      </p:sp>
-      <p:sp>
-        <p:nvSpPr>
-          <p:cNvPr id="2" name="Title 1"/>
-          <p:cNvSpPr>
-            <a:spLocks noGrp="1"/>
-          </p:cNvSpPr>
-          <p:nvPr>
-            <p:ph type="ctrTitle"/>
-          </p:nvPr>
-        </p:nvSpPr>
-        <p:spPr/>
-        <p:txBody>
-          <a:bodyPr/>
-          <a:lstStyle/>
-          <a:p>
-            <a:r>
-              <a:t>Hello, World! 2</a:t>
-            </a:r>
-          </a:p>
-        </p:txBody>
-      </p:sp>
-      <p:sp>
-        <p:nvSpPr>
-          <p:cNvPr id="3" name="Subtitle 2"/>
-          <p:cNvSpPr>
-            <a:spLocks noGrp="1"/>
-          </p:cNvSpPr>
-          <p:nvPr>
-            <p:ph type="subTitle" idx="1"/>
-          </p:nvPr>
-        </p:nvSpPr>
-        <p:spPr/>
-        <p:txBody>
-          <a:bodyPr/>
-          <a:lstStyle/>
-          <a:p>
-            <a:r>
-              <a:t>python-pptx was here!</a:t>
+      </p:pic>
+      <p:pic>
+        <p:nvPicPr>
+          <p:cNvPr id="3" name="Picture 2" descr="CrossFlame_WhiteRed.png"/>
+          <p:cNvPicPr>
+            <a:picLocks noChangeAspect="1"/>
+          </p:cNvPicPr>
+          <p:nvPr/>
+        </p:nvPicPr>
+        <p:blipFill>
+          <a:blip r:embed="rId3"/>
+          <a:stretch>
+            <a:fillRect/>
+          </a:stretch>
+        </p:blipFill>
+        <p:spPr>
+          <a:xfrm>
+            <a:off x="-1143000" y="5943600"/>
+            <a:ext cx="3538682" cy="2286000"/>
+          </a:xfrm>
+          <a:prstGeom prst="rect">
+            <a:avLst/>
+          </a:prstGeom>
+        </p:spPr>
+      </p:pic>
+      <p:sp>
+        <p:nvSpPr>
+          <p:cNvPr id="4" name="TextBox 3"/>
+          <p:cNvSpPr txBox="1"/>
+          <p:nvPr/>
+        </p:nvSpPr>
+        <p:spPr>
+          <a:xfrm>
+            <a:off x="1371600" y="5943600"/>
+            <a:ext cx="13258800" cy="2286000"/>
+          </a:xfrm>
+          <a:prstGeom prst="rect">
+            <a:avLst/>
+          </a:prstGeom>
+          <a:noFill/>
+        </p:spPr>
+        <p:txBody>
+          <a:bodyPr wrap="square" anchor="ctr"/>
+          <a:lstStyle/>
+          <a:p>
+            <a:pPr algn="ctr">
+              <a:defRPr sz="2400" b="1">
+                <a:latin typeface="Arial"/>
+              </a:defRPr>
+            </a:pPr>
+            <a:r>
+              <a:t>Lorem ipsum dolor sit amet, consectetur adipiscing elit. Sed do eiusmod tempor incididunt ut labore et dolore magna aliqua. Ut enim ad minim veniam, quis nostrud exercitation ullamco laboris nisi ut aliquip ex ea commodo consequat. Duis aute irure dolor in reprehenderit in voluptate.</a:t>
             </a:r>
           </a:p>
         </p:txBody>
@@ -3631,81 +3416,81 @@
         <p:nvPr/>
       </p:nvGrpSpPr>
       <p:grpSpPr/>
-      <p:sp>
-        <p:nvSpPr>
-          <p:cNvPr id="4" name="Rectangle 3"/>
-          <p:cNvSpPr/>
+      <p:pic>
+        <p:nvPicPr>
+          <p:cNvPr id="2" name="Picture 1" descr="text_plate.png"/>
+          <p:cNvPicPr>
+            <a:picLocks noChangeAspect="1"/>
+          </p:cNvPicPr>
           <p:nvPr/>
-        </p:nvSpPr>
+        </p:nvPicPr>
+        <p:blipFill>
+          <a:blip r:embed="rId2"/>
+          <a:stretch>
+            <a:fillRect/>
+          </a:stretch>
+        </p:blipFill>
         <p:spPr>
           <a:xfrm>
-            <a:off x="0" y="2743200"/>
-            <a:ext cx="9144000" cy="2286000"/>
+            <a:off x="1371600" y="5943600"/>
+            <a:ext cx="13258800" cy="2286000"/>
           </a:xfrm>
           <a:prstGeom prst="rect">
             <a:avLst/>
           </a:prstGeom>
         </p:spPr>
-        <p:style>
-          <a:lnRef idx="1">
-            <a:schemeClr val="accent1"/>
-          </a:lnRef>
-          <a:fillRef idx="3">
-            <a:schemeClr val="accent1"/>
-          </a:fillRef>
-          <a:effectRef idx="2">
-            <a:schemeClr val="accent1"/>
-          </a:effectRef>
-          <a:fontRef idx="minor">
-            <a:schemeClr val="lt1"/>
-          </a:fontRef>
-        </p:style>
-        <p:txBody>
-          <a:bodyPr rtlCol="0" anchor="ctr"/>
-          <a:lstStyle/>
-          <a:p>
-            <a:pPr algn="ctr"/>
-          </a:p>
-        </p:txBody>
-      </p:sp>
-      <p:sp>
-        <p:nvSpPr>
-          <p:cNvPr id="2" name="Title 1"/>
-          <p:cNvSpPr>
-            <a:spLocks noGrp="1"/>
-          </p:cNvSpPr>
-          <p:nvPr>
-            <p:ph type="ctrTitle"/>
-          </p:nvPr>
-        </p:nvSpPr>
-        <p:spPr/>
-        <p:txBody>
-          <a:bodyPr/>
-          <a:lstStyle/>
-          <a:p>
-            <a:r>
-              <a:t>Hello, World! 3</a:t>
-            </a:r>
-          </a:p>
-        </p:txBody>
-      </p:sp>
-      <p:sp>
-        <p:nvSpPr>
-          <p:cNvPr id="3" name="Subtitle 2"/>
-          <p:cNvSpPr>
-            <a:spLocks noGrp="1"/>
-          </p:cNvSpPr>
-          <p:nvPr>
-            <p:ph type="subTitle" idx="1"/>
-          </p:nvPr>
-        </p:nvSpPr>
-        <p:spPr/>
-        <p:txBody>
-          <a:bodyPr/>
-          <a:lstStyle/>
-          <a:p>
-            <a:r>
-              <a:t>python-pptx was here!</a:t>
+      </p:pic>
+      <p:pic>
+        <p:nvPicPr>
+          <p:cNvPr id="3" name="Picture 2" descr="CrossFlame_WhiteRed.png"/>
+          <p:cNvPicPr>
+            <a:picLocks noChangeAspect="1"/>
+          </p:cNvPicPr>
+          <p:nvPr/>
+        </p:nvPicPr>
+        <p:blipFill>
+          <a:blip r:embed="rId3"/>
+          <a:stretch>
+            <a:fillRect/>
+          </a:stretch>
+        </p:blipFill>
+        <p:spPr>
+          <a:xfrm>
+            <a:off x="-1143000" y="5943600"/>
+            <a:ext cx="3538682" cy="2286000"/>
+          </a:xfrm>
+          <a:prstGeom prst="rect">
+            <a:avLst/>
+          </a:prstGeom>
+        </p:spPr>
+      </p:pic>
+      <p:sp>
+        <p:nvSpPr>
+          <p:cNvPr id="4" name="TextBox 3"/>
+          <p:cNvSpPr txBox="1"/>
+          <p:nvPr/>
+        </p:nvSpPr>
+        <p:spPr>
+          <a:xfrm>
+            <a:off x="1371600" y="5943600"/>
+            <a:ext cx="13258800" cy="2286000"/>
+          </a:xfrm>
+          <a:prstGeom prst="rect">
+            <a:avLst/>
+          </a:prstGeom>
+          <a:noFill/>
+        </p:spPr>
+        <p:txBody>
+          <a:bodyPr wrap="square" anchor="ctr"/>
+          <a:lstStyle/>
+          <a:p>
+            <a:pPr algn="ctr">
+              <a:defRPr sz="2400" b="1">
+                <a:latin typeface="Arial"/>
+              </a:defRPr>
+            </a:pPr>
+            <a:r>
+              <a:t>Lorem ipsum dolor sit amet, consectetur adipiscing elit. Sed do eiusmod tempor incididunt ut labore et dolore magna aliqua. Ut enim ad minim veniam, quis nostrud exercitation ullamco laboris nisi ut aliquip ex ea commodo consequat. Duis aute irure dolor in reprehenderit in voluptate.</a:t>
             </a:r>
           </a:p>
         </p:txBody>
@@ -3736,81 +3521,81 @@
         <p:nvPr/>
       </p:nvGrpSpPr>
       <p:grpSpPr/>
-      <p:sp>
-        <p:nvSpPr>
-          <p:cNvPr id="4" name="Rectangle 3"/>
-          <p:cNvSpPr/>
+      <p:pic>
+        <p:nvPicPr>
+          <p:cNvPr id="2" name="Picture 1" descr="text_plate.png"/>
+          <p:cNvPicPr>
+            <a:picLocks noChangeAspect="1"/>
+          </p:cNvPicPr>
           <p:nvPr/>
-        </p:nvSpPr>
+        </p:nvPicPr>
+        <p:blipFill>
+          <a:blip r:embed="rId2"/>
+          <a:stretch>
+            <a:fillRect/>
+          </a:stretch>
+        </p:blipFill>
         <p:spPr>
           <a:xfrm>
-            <a:off x="0" y="2743200"/>
-            <a:ext cx="9144000" cy="2286000"/>
+            <a:off x="1371600" y="5943600"/>
+            <a:ext cx="13258800" cy="2286000"/>
           </a:xfrm>
           <a:prstGeom prst="rect">
             <a:avLst/>
           </a:prstGeom>
         </p:spPr>
-        <p:style>
-          <a:lnRef idx="1">
-            <a:schemeClr val="accent1"/>
-          </a:lnRef>
-          <a:fillRef idx="3">
-            <a:schemeClr val="accent1"/>
-          </a:fillRef>
-          <a:effectRef idx="2">
-            <a:schemeClr val="accent1"/>
-          </a:effectRef>
-          <a:fontRef idx="minor">
-            <a:schemeClr val="lt1"/>
-          </a:fontRef>
-        </p:style>
-        <p:txBody>
-          <a:bodyPr rtlCol="0" anchor="ctr"/>
-          <a:lstStyle/>
-          <a:p>
-            <a:pPr algn="ctr"/>
-          </a:p>
-        </p:txBody>
-      </p:sp>
-      <p:sp>
-        <p:nvSpPr>
-          <p:cNvPr id="2" name="Title 1"/>
-          <p:cNvSpPr>
-            <a:spLocks noGrp="1"/>
-          </p:cNvSpPr>
-          <p:nvPr>
-            <p:ph type="ctrTitle"/>
-          </p:nvPr>
-        </p:nvSpPr>
-        <p:spPr/>
-        <p:txBody>
-          <a:bodyPr/>
-          <a:lstStyle/>
-          <a:p>
-            <a:r>
-              <a:t>Hello, World! 4</a:t>
-            </a:r>
-          </a:p>
-        </p:txBody>
-      </p:sp>
-      <p:sp>
-        <p:nvSpPr>
-          <p:cNvPr id="3" name="Subtitle 2"/>
-          <p:cNvSpPr>
-            <a:spLocks noGrp="1"/>
-          </p:cNvSpPr>
-          <p:nvPr>
-            <p:ph type="subTitle" idx="1"/>
-          </p:nvPr>
-        </p:nvSpPr>
-        <p:spPr/>
-        <p:txBody>
-          <a:bodyPr/>
-          <a:lstStyle/>
-          <a:p>
-            <a:r>
-              <a:t>python-pptx was here!</a:t>
+      </p:pic>
+      <p:pic>
+        <p:nvPicPr>
+          <p:cNvPr id="3" name="Picture 2" descr="CrossFlame_WhiteRed.png"/>
+          <p:cNvPicPr>
+            <a:picLocks noChangeAspect="1"/>
+          </p:cNvPicPr>
+          <p:nvPr/>
+        </p:nvPicPr>
+        <p:blipFill>
+          <a:blip r:embed="rId3"/>
+          <a:stretch>
+            <a:fillRect/>
+          </a:stretch>
+        </p:blipFill>
+        <p:spPr>
+          <a:xfrm>
+            <a:off x="-1143000" y="5943600"/>
+            <a:ext cx="3538682" cy="2286000"/>
+          </a:xfrm>
+          <a:prstGeom prst="rect">
+            <a:avLst/>
+          </a:prstGeom>
+        </p:spPr>
+      </p:pic>
+      <p:sp>
+        <p:nvSpPr>
+          <p:cNvPr id="4" name="TextBox 3"/>
+          <p:cNvSpPr txBox="1"/>
+          <p:nvPr/>
+        </p:nvSpPr>
+        <p:spPr>
+          <a:xfrm>
+            <a:off x="1371600" y="5943600"/>
+            <a:ext cx="13258800" cy="2286000"/>
+          </a:xfrm>
+          <a:prstGeom prst="rect">
+            <a:avLst/>
+          </a:prstGeom>
+          <a:noFill/>
+        </p:spPr>
+        <p:txBody>
+          <a:bodyPr wrap="square" anchor="ctr"/>
+          <a:lstStyle/>
+          <a:p>
+            <a:pPr algn="ctr">
+              <a:defRPr sz="2400" b="1">
+                <a:latin typeface="Arial"/>
+              </a:defRPr>
+            </a:pPr>
+            <a:r>
+              <a:t>Lorem ipsum dolor sit amet, consectetur adipiscing elit. Sed do eiusmod tempor incididunt ut labore et dolore magna aliqua. Ut enim ad minim veniam, quis nostrud exercitation ullamco laboris nisi ut aliquip ex ea commodo consequat. Duis aute irure dolor in reprehenderit in voluptate.</a:t>
             </a:r>
           </a:p>
         </p:txBody>
@@ -3841,396 +3626,81 @@
         <p:nvPr/>
       </p:nvGrpSpPr>
       <p:grpSpPr/>
-      <p:sp>
-        <p:nvSpPr>
-          <p:cNvPr id="4" name="Rectangle 3"/>
-          <p:cNvSpPr/>
+      <p:pic>
+        <p:nvPicPr>
+          <p:cNvPr id="2" name="Picture 1" descr="text_plate.png"/>
+          <p:cNvPicPr>
+            <a:picLocks noChangeAspect="1"/>
+          </p:cNvPicPr>
           <p:nvPr/>
-        </p:nvSpPr>
+        </p:nvPicPr>
+        <p:blipFill>
+          <a:blip r:embed="rId2"/>
+          <a:stretch>
+            <a:fillRect/>
+          </a:stretch>
+        </p:blipFill>
         <p:spPr>
           <a:xfrm>
-            <a:off x="0" y="2743200"/>
-            <a:ext cx="9144000" cy="2286000"/>
+            <a:off x="1371600" y="5943600"/>
+            <a:ext cx="13258800" cy="2286000"/>
           </a:xfrm>
           <a:prstGeom prst="rect">
             <a:avLst/>
           </a:prstGeom>
         </p:spPr>
-        <p:style>
-          <a:lnRef idx="1">
-            <a:schemeClr val="accent1"/>
-          </a:lnRef>
-          <a:fillRef idx="3">
-            <a:schemeClr val="accent1"/>
-          </a:fillRef>
-          <a:effectRef idx="2">
-            <a:schemeClr val="accent1"/>
-          </a:effectRef>
-          <a:fontRef idx="minor">
-            <a:schemeClr val="lt1"/>
-          </a:fontRef>
-        </p:style>
-        <p:txBody>
-          <a:bodyPr rtlCol="0" anchor="ctr"/>
-          <a:lstStyle/>
-          <a:p>
-            <a:pPr algn="ctr"/>
-          </a:p>
-        </p:txBody>
-      </p:sp>
-      <p:sp>
-        <p:nvSpPr>
-          <p:cNvPr id="2" name="Title 1"/>
-          <p:cNvSpPr>
-            <a:spLocks noGrp="1"/>
-          </p:cNvSpPr>
-          <p:nvPr>
-            <p:ph type="ctrTitle"/>
-          </p:nvPr>
-        </p:nvSpPr>
-        <p:spPr/>
-        <p:txBody>
-          <a:bodyPr/>
-          <a:lstStyle/>
-          <a:p>
-            <a:r>
-              <a:t>Hello, World! 5</a:t>
-            </a:r>
-          </a:p>
-        </p:txBody>
-      </p:sp>
-      <p:sp>
-        <p:nvSpPr>
-          <p:cNvPr id="3" name="Subtitle 2"/>
-          <p:cNvSpPr>
-            <a:spLocks noGrp="1"/>
-          </p:cNvSpPr>
-          <p:nvPr>
-            <p:ph type="subTitle" idx="1"/>
-          </p:nvPr>
-        </p:nvSpPr>
-        <p:spPr/>
-        <p:txBody>
-          <a:bodyPr/>
-          <a:lstStyle/>
-          <a:p>
-            <a:r>
-              <a:t>python-pptx was here!</a:t>
-            </a:r>
-          </a:p>
-        </p:txBody>
-      </p:sp>
-    </p:spTree>
-  </p:cSld>
-  <p:clrMapOvr>
-    <a:masterClrMapping/>
-  </p:clrMapOvr>
-</p:sld>
-</file>
-
-<file path=ppt/slides/slide7.xml><?xml version="1.0" encoding="utf-8"?>
-<p:sld xmlns:a="http://schemas.openxmlformats.org/drawingml/2006/main" xmlns:p="http://schemas.openxmlformats.org/presentationml/2006/main" xmlns:r="http://schemas.openxmlformats.org/officeDocument/2006/relationships">
-  <p:cSld>
-    <p:bg>
-      <p:bgPr>
-        <a:solidFill>
-          <a:srgbClr val="00FF00"/>
-        </a:solidFill>
-        <a:effectLst/>
-      </p:bgPr>
-    </p:bg>
-    <p:spTree>
-      <p:nvGrpSpPr>
-        <p:cNvPr id="1" name=""/>
-        <p:cNvGrpSpPr/>
-        <p:nvPr/>
-      </p:nvGrpSpPr>
-      <p:grpSpPr/>
-      <p:sp>
-        <p:nvSpPr>
-          <p:cNvPr id="4" name="Rectangle 3"/>
-          <p:cNvSpPr/>
+      </p:pic>
+      <p:pic>
+        <p:nvPicPr>
+          <p:cNvPr id="3" name="Picture 2" descr="CrossFlame_WhiteRed.png"/>
+          <p:cNvPicPr>
+            <a:picLocks noChangeAspect="1"/>
+          </p:cNvPicPr>
           <p:nvPr/>
-        </p:nvSpPr>
+        </p:nvPicPr>
+        <p:blipFill>
+          <a:blip r:embed="rId3"/>
+          <a:stretch>
+            <a:fillRect/>
+          </a:stretch>
+        </p:blipFill>
         <p:spPr>
           <a:xfrm>
-            <a:off x="0" y="2743200"/>
-            <a:ext cx="9144000" cy="2286000"/>
+            <a:off x="-1143000" y="5943600"/>
+            <a:ext cx="3538682" cy="2286000"/>
           </a:xfrm>
           <a:prstGeom prst="rect">
             <a:avLst/>
           </a:prstGeom>
         </p:spPr>
-        <p:style>
-          <a:lnRef idx="1">
-            <a:schemeClr val="accent1"/>
-          </a:lnRef>
-          <a:fillRef idx="3">
-            <a:schemeClr val="accent1"/>
-          </a:fillRef>
-          <a:effectRef idx="2">
-            <a:schemeClr val="accent1"/>
-          </a:effectRef>
-          <a:fontRef idx="minor">
-            <a:schemeClr val="lt1"/>
-          </a:fontRef>
-        </p:style>
-        <p:txBody>
-          <a:bodyPr rtlCol="0" anchor="ctr"/>
-          <a:lstStyle/>
-          <a:p>
-            <a:pPr algn="ctr"/>
-          </a:p>
-        </p:txBody>
-      </p:sp>
-      <p:sp>
-        <p:nvSpPr>
-          <p:cNvPr id="2" name="Title 1"/>
-          <p:cNvSpPr>
-            <a:spLocks noGrp="1"/>
-          </p:cNvSpPr>
-          <p:nvPr>
-            <p:ph type="ctrTitle"/>
-          </p:nvPr>
-        </p:nvSpPr>
-        <p:spPr/>
-        <p:txBody>
-          <a:bodyPr/>
-          <a:lstStyle/>
-          <a:p>
-            <a:r>
-              <a:t>Hello, World! 6</a:t>
-            </a:r>
-          </a:p>
-        </p:txBody>
-      </p:sp>
-      <p:sp>
-        <p:nvSpPr>
-          <p:cNvPr id="3" name="Subtitle 2"/>
-          <p:cNvSpPr>
-            <a:spLocks noGrp="1"/>
-          </p:cNvSpPr>
-          <p:nvPr>
-            <p:ph type="subTitle" idx="1"/>
-          </p:nvPr>
-        </p:nvSpPr>
-        <p:spPr/>
-        <p:txBody>
-          <a:bodyPr/>
-          <a:lstStyle/>
-          <a:p>
-            <a:r>
-              <a:t>python-pptx was here!</a:t>
-            </a:r>
-          </a:p>
-        </p:txBody>
-      </p:sp>
-    </p:spTree>
-  </p:cSld>
-  <p:clrMapOvr>
-    <a:masterClrMapping/>
-  </p:clrMapOvr>
-</p:sld>
-</file>
-
-<file path=ppt/slides/slide8.xml><?xml version="1.0" encoding="utf-8"?>
-<p:sld xmlns:a="http://schemas.openxmlformats.org/drawingml/2006/main" xmlns:p="http://schemas.openxmlformats.org/presentationml/2006/main" xmlns:r="http://schemas.openxmlformats.org/officeDocument/2006/relationships">
-  <p:cSld>
-    <p:bg>
-      <p:bgPr>
-        <a:solidFill>
-          <a:srgbClr val="00FF00"/>
-        </a:solidFill>
-        <a:effectLst/>
-      </p:bgPr>
-    </p:bg>
-    <p:spTree>
-      <p:nvGrpSpPr>
-        <p:cNvPr id="1" name=""/>
-        <p:cNvGrpSpPr/>
-        <p:nvPr/>
-      </p:nvGrpSpPr>
-      <p:grpSpPr/>
-      <p:sp>
-        <p:nvSpPr>
-          <p:cNvPr id="4" name="Rectangle 3"/>
-          <p:cNvSpPr/>
+      </p:pic>
+      <p:sp>
+        <p:nvSpPr>
+          <p:cNvPr id="4" name="TextBox 3"/>
+          <p:cNvSpPr txBox="1"/>
           <p:nvPr/>
         </p:nvSpPr>
         <p:spPr>
           <a:xfrm>
-            <a:off x="0" y="2743200"/>
-            <a:ext cx="9144000" cy="2286000"/>
+            <a:off x="1371600" y="5943600"/>
+            <a:ext cx="13258800" cy="2286000"/>
           </a:xfrm>
           <a:prstGeom prst="rect">
             <a:avLst/>
           </a:prstGeom>
+          <a:noFill/>
         </p:spPr>
-        <p:style>
-          <a:lnRef idx="1">
-            <a:schemeClr val="accent1"/>
-          </a:lnRef>
-          <a:fillRef idx="3">
-            <a:schemeClr val="accent1"/>
-          </a:fillRef>
-          <a:effectRef idx="2">
-            <a:schemeClr val="accent1"/>
-          </a:effectRef>
-          <a:fontRef idx="minor">
-            <a:schemeClr val="lt1"/>
-          </a:fontRef>
-        </p:style>
-        <p:txBody>
-          <a:bodyPr rtlCol="0" anchor="ctr"/>
-          <a:lstStyle/>
-          <a:p>
-            <a:pPr algn="ctr"/>
-          </a:p>
-        </p:txBody>
-      </p:sp>
-      <p:sp>
-        <p:nvSpPr>
-          <p:cNvPr id="2" name="Title 1"/>
-          <p:cNvSpPr>
-            <a:spLocks noGrp="1"/>
-          </p:cNvSpPr>
-          <p:nvPr>
-            <p:ph type="ctrTitle"/>
-          </p:nvPr>
-        </p:nvSpPr>
-        <p:spPr/>
-        <p:txBody>
-          <a:bodyPr/>
-          <a:lstStyle/>
-          <a:p>
-            <a:r>
-              <a:t>Hello, World! 7</a:t>
-            </a:r>
-          </a:p>
-        </p:txBody>
-      </p:sp>
-      <p:sp>
-        <p:nvSpPr>
-          <p:cNvPr id="3" name="Subtitle 2"/>
-          <p:cNvSpPr>
-            <a:spLocks noGrp="1"/>
-          </p:cNvSpPr>
-          <p:nvPr>
-            <p:ph type="subTitle" idx="1"/>
-          </p:nvPr>
-        </p:nvSpPr>
-        <p:spPr/>
-        <p:txBody>
-          <a:bodyPr/>
-          <a:lstStyle/>
-          <a:p>
-            <a:r>
-              <a:t>python-pptx was here!</a:t>
-            </a:r>
-          </a:p>
-        </p:txBody>
-      </p:sp>
-    </p:spTree>
-  </p:cSld>
-  <p:clrMapOvr>
-    <a:masterClrMapping/>
-  </p:clrMapOvr>
-</p:sld>
-</file>
-
-<file path=ppt/slides/slide9.xml><?xml version="1.0" encoding="utf-8"?>
-<p:sld xmlns:a="http://schemas.openxmlformats.org/drawingml/2006/main" xmlns:p="http://schemas.openxmlformats.org/presentationml/2006/main" xmlns:r="http://schemas.openxmlformats.org/officeDocument/2006/relationships">
-  <p:cSld>
-    <p:bg>
-      <p:bgPr>
-        <a:solidFill>
-          <a:srgbClr val="00FF00"/>
-        </a:solidFill>
-        <a:effectLst/>
-      </p:bgPr>
-    </p:bg>
-    <p:spTree>
-      <p:nvGrpSpPr>
-        <p:cNvPr id="1" name=""/>
-        <p:cNvGrpSpPr/>
-        <p:nvPr/>
-      </p:nvGrpSpPr>
-      <p:grpSpPr/>
-      <p:sp>
-        <p:nvSpPr>
-          <p:cNvPr id="4" name="Rectangle 3"/>
-          <p:cNvSpPr/>
-          <p:nvPr/>
-        </p:nvSpPr>
-        <p:spPr>
-          <a:xfrm>
-            <a:off x="0" y="2743200"/>
-            <a:ext cx="9144000" cy="2286000"/>
-          </a:xfrm>
-          <a:prstGeom prst="rect">
-            <a:avLst/>
-          </a:prstGeom>
-        </p:spPr>
-        <p:style>
-          <a:lnRef idx="1">
-            <a:schemeClr val="accent1"/>
-          </a:lnRef>
-          <a:fillRef idx="3">
-            <a:schemeClr val="accent1"/>
-          </a:fillRef>
-          <a:effectRef idx="2">
-            <a:schemeClr val="accent1"/>
-          </a:effectRef>
-          <a:fontRef idx="minor">
-            <a:schemeClr val="lt1"/>
-          </a:fontRef>
-        </p:style>
-        <p:txBody>
-          <a:bodyPr rtlCol="0" anchor="ctr"/>
-          <a:lstStyle/>
-          <a:p>
-            <a:pPr algn="ctr"/>
-          </a:p>
-        </p:txBody>
-      </p:sp>
-      <p:sp>
-        <p:nvSpPr>
-          <p:cNvPr id="2" name="Title 1"/>
-          <p:cNvSpPr>
-            <a:spLocks noGrp="1"/>
-          </p:cNvSpPr>
-          <p:nvPr>
-            <p:ph type="ctrTitle"/>
-          </p:nvPr>
-        </p:nvSpPr>
-        <p:spPr/>
-        <p:txBody>
-          <a:bodyPr/>
-          <a:lstStyle/>
-          <a:p>
-            <a:r>
-              <a:t>Hello, World! 8</a:t>
-            </a:r>
-          </a:p>
-        </p:txBody>
-      </p:sp>
-      <p:sp>
-        <p:nvSpPr>
-          <p:cNvPr id="3" name="Subtitle 2"/>
-          <p:cNvSpPr>
-            <a:spLocks noGrp="1"/>
-          </p:cNvSpPr>
-          <p:nvPr>
-            <p:ph type="subTitle" idx="1"/>
-          </p:nvPr>
-        </p:nvSpPr>
-        <p:spPr/>
-        <p:txBody>
-          <a:bodyPr/>
-          <a:lstStyle/>
-          <a:p>
-            <a:r>
-              <a:t>python-pptx was here!</a:t>
+        <p:txBody>
+          <a:bodyPr wrap="square" anchor="ctr"/>
+          <a:lstStyle/>
+          <a:p>
+            <a:pPr algn="ctr">
+              <a:defRPr sz="2400" b="1">
+                <a:latin typeface="Arial"/>
+              </a:defRPr>
+            </a:pPr>
+            <a:r>
+              <a:t>Lorem ipsum dolor sit amet, consectetur adipiscing elit. Sed do eiusmod tempor incididunt ut labore et dolore magna aliqua. Ut enim ad minim veniam, quis nostrud exercitation ullamco laboris nisi ut aliquip ex ea commodo consequat. Duis aute irure dolor in reprehenderit in voluptate.</a:t>
             </a:r>
           </a:p>
         </p:txBody>

</xml_diff>

<commit_message>
added title slide layout + functionization (not final)
</commit_message>
<xml_diff>
--- a/src/testing/create_slides/test.pptx
+++ b/src/testing/create_slides/test.pptx
@@ -9,8 +9,6 @@
     <p:sldId id="257" r:id="rId8"/>
     <p:sldId id="258" r:id="rId9"/>
     <p:sldId id="259" r:id="rId10"/>
-    <p:sldId id="260" r:id="rId11"/>
-    <p:sldId id="261" r:id="rId12"/>
   </p:sldIdLst>
   <p:sldSz cx="14630400" cy="8229600" type="screen4x3"/>
   <p:notesSz cx="6858000" cy="9144000"/>
@@ -3170,12 +3168,12 @@
           <a:lstStyle/>
           <a:p>
             <a:pPr algn="ctr">
-              <a:defRPr sz="2400" b="1">
+              <a:defRPr sz="4000" b="1">
                 <a:latin typeface="Arial"/>
               </a:defRPr>
             </a:pPr>
             <a:r>
-              <a:t>Lorem ipsum dolor sit amet, consectetur adipiscing elit. Sed do eiusmod tempor incididunt ut labore et dolore magna aliqua. Ut enim ad minim veniam, quis nostrud exercitation ullamco laboris nisi ut aliquip ex ea commodo consequat. Duis aute irure dolor in reprehenderit in voluptate.</a:t>
+              <a:t>Title Slide: Placeholder Name</a:t>
             </a:r>
           </a:p>
         </p:txBody>
@@ -3399,216 +3397,6 @@
 </file>
 
 <file path=ppt/slides/slide4.xml><?xml version="1.0" encoding="utf-8"?>
-<p:sld xmlns:a="http://schemas.openxmlformats.org/drawingml/2006/main" xmlns:p="http://schemas.openxmlformats.org/presentationml/2006/main" xmlns:r="http://schemas.openxmlformats.org/officeDocument/2006/relationships">
-  <p:cSld>
-    <p:bg>
-      <p:bgPr>
-        <a:solidFill>
-          <a:srgbClr val="00FF00"/>
-        </a:solidFill>
-        <a:effectLst/>
-      </p:bgPr>
-    </p:bg>
-    <p:spTree>
-      <p:nvGrpSpPr>
-        <p:cNvPr id="1" name=""/>
-        <p:cNvGrpSpPr/>
-        <p:nvPr/>
-      </p:nvGrpSpPr>
-      <p:grpSpPr/>
-      <p:pic>
-        <p:nvPicPr>
-          <p:cNvPr id="2" name="Picture 1" descr="text_plate.png"/>
-          <p:cNvPicPr>
-            <a:picLocks noChangeAspect="1"/>
-          </p:cNvPicPr>
-          <p:nvPr/>
-        </p:nvPicPr>
-        <p:blipFill>
-          <a:blip r:embed="rId2"/>
-          <a:stretch>
-            <a:fillRect/>
-          </a:stretch>
-        </p:blipFill>
-        <p:spPr>
-          <a:xfrm>
-            <a:off x="1371600" y="5943600"/>
-            <a:ext cx="13258800" cy="2286000"/>
-          </a:xfrm>
-          <a:prstGeom prst="rect">
-            <a:avLst/>
-          </a:prstGeom>
-        </p:spPr>
-      </p:pic>
-      <p:pic>
-        <p:nvPicPr>
-          <p:cNvPr id="3" name="Picture 2" descr="CrossFlame_WhiteRed.png"/>
-          <p:cNvPicPr>
-            <a:picLocks noChangeAspect="1"/>
-          </p:cNvPicPr>
-          <p:nvPr/>
-        </p:nvPicPr>
-        <p:blipFill>
-          <a:blip r:embed="rId3"/>
-          <a:stretch>
-            <a:fillRect/>
-          </a:stretch>
-        </p:blipFill>
-        <p:spPr>
-          <a:xfrm>
-            <a:off x="-1143000" y="5943600"/>
-            <a:ext cx="3538682" cy="2286000"/>
-          </a:xfrm>
-          <a:prstGeom prst="rect">
-            <a:avLst/>
-          </a:prstGeom>
-        </p:spPr>
-      </p:pic>
-      <p:sp>
-        <p:nvSpPr>
-          <p:cNvPr id="4" name="TextBox 3"/>
-          <p:cNvSpPr txBox="1"/>
-          <p:nvPr/>
-        </p:nvSpPr>
-        <p:spPr>
-          <a:xfrm>
-            <a:off x="1371600" y="5943600"/>
-            <a:ext cx="13258800" cy="2286000"/>
-          </a:xfrm>
-          <a:prstGeom prst="rect">
-            <a:avLst/>
-          </a:prstGeom>
-          <a:noFill/>
-        </p:spPr>
-        <p:txBody>
-          <a:bodyPr wrap="square" anchor="ctr"/>
-          <a:lstStyle/>
-          <a:p>
-            <a:pPr algn="ctr">
-              <a:defRPr sz="2400" b="1">
-                <a:latin typeface="Arial"/>
-              </a:defRPr>
-            </a:pPr>
-            <a:r>
-              <a:t>Lorem ipsum dolor sit amet, consectetur adipiscing elit. Sed do eiusmod tempor incididunt ut labore et dolore magna aliqua. Ut enim ad minim veniam, quis nostrud exercitation ullamco laboris nisi ut aliquip ex ea commodo consequat. Duis aute irure dolor in reprehenderit in voluptate.</a:t>
-            </a:r>
-          </a:p>
-        </p:txBody>
-      </p:sp>
-    </p:spTree>
-  </p:cSld>
-  <p:clrMapOvr>
-    <a:masterClrMapping/>
-  </p:clrMapOvr>
-</p:sld>
-</file>
-
-<file path=ppt/slides/slide5.xml><?xml version="1.0" encoding="utf-8"?>
-<p:sld xmlns:a="http://schemas.openxmlformats.org/drawingml/2006/main" xmlns:p="http://schemas.openxmlformats.org/presentationml/2006/main" xmlns:r="http://schemas.openxmlformats.org/officeDocument/2006/relationships">
-  <p:cSld>
-    <p:bg>
-      <p:bgPr>
-        <a:solidFill>
-          <a:srgbClr val="00FF00"/>
-        </a:solidFill>
-        <a:effectLst/>
-      </p:bgPr>
-    </p:bg>
-    <p:spTree>
-      <p:nvGrpSpPr>
-        <p:cNvPr id="1" name=""/>
-        <p:cNvGrpSpPr/>
-        <p:nvPr/>
-      </p:nvGrpSpPr>
-      <p:grpSpPr/>
-      <p:pic>
-        <p:nvPicPr>
-          <p:cNvPr id="2" name="Picture 1" descr="text_plate.png"/>
-          <p:cNvPicPr>
-            <a:picLocks noChangeAspect="1"/>
-          </p:cNvPicPr>
-          <p:nvPr/>
-        </p:nvPicPr>
-        <p:blipFill>
-          <a:blip r:embed="rId2"/>
-          <a:stretch>
-            <a:fillRect/>
-          </a:stretch>
-        </p:blipFill>
-        <p:spPr>
-          <a:xfrm>
-            <a:off x="1371600" y="5943600"/>
-            <a:ext cx="13258800" cy="2286000"/>
-          </a:xfrm>
-          <a:prstGeom prst="rect">
-            <a:avLst/>
-          </a:prstGeom>
-        </p:spPr>
-      </p:pic>
-      <p:pic>
-        <p:nvPicPr>
-          <p:cNvPr id="3" name="Picture 2" descr="CrossFlame_WhiteRed.png"/>
-          <p:cNvPicPr>
-            <a:picLocks noChangeAspect="1"/>
-          </p:cNvPicPr>
-          <p:nvPr/>
-        </p:nvPicPr>
-        <p:blipFill>
-          <a:blip r:embed="rId3"/>
-          <a:stretch>
-            <a:fillRect/>
-          </a:stretch>
-        </p:blipFill>
-        <p:spPr>
-          <a:xfrm>
-            <a:off x="-1143000" y="5943600"/>
-            <a:ext cx="3538682" cy="2286000"/>
-          </a:xfrm>
-          <a:prstGeom prst="rect">
-            <a:avLst/>
-          </a:prstGeom>
-        </p:spPr>
-      </p:pic>
-      <p:sp>
-        <p:nvSpPr>
-          <p:cNvPr id="4" name="TextBox 3"/>
-          <p:cNvSpPr txBox="1"/>
-          <p:nvPr/>
-        </p:nvSpPr>
-        <p:spPr>
-          <a:xfrm>
-            <a:off x="1371600" y="5943600"/>
-            <a:ext cx="13258800" cy="2286000"/>
-          </a:xfrm>
-          <a:prstGeom prst="rect">
-            <a:avLst/>
-          </a:prstGeom>
-          <a:noFill/>
-        </p:spPr>
-        <p:txBody>
-          <a:bodyPr wrap="square" anchor="ctr"/>
-          <a:lstStyle/>
-          <a:p>
-            <a:pPr algn="ctr">
-              <a:defRPr sz="2400" b="1">
-                <a:latin typeface="Arial"/>
-              </a:defRPr>
-            </a:pPr>
-            <a:r>
-              <a:t>Lorem ipsum dolor sit amet, consectetur adipiscing elit. Sed do eiusmod tempor incididunt ut labore et dolore magna aliqua. Ut enim ad minim veniam, quis nostrud exercitation ullamco laboris nisi ut aliquip ex ea commodo consequat. Duis aute irure dolor in reprehenderit in voluptate.</a:t>
-            </a:r>
-          </a:p>
-        </p:txBody>
-      </p:sp>
-    </p:spTree>
-  </p:cSld>
-  <p:clrMapOvr>
-    <a:masterClrMapping/>
-  </p:clrMapOvr>
-</p:sld>
-</file>
-
-<file path=ppt/slides/slide6.xml><?xml version="1.0" encoding="utf-8"?>
 <p:sld xmlns:a="http://schemas.openxmlformats.org/drawingml/2006/main" xmlns:p="http://schemas.openxmlformats.org/presentationml/2006/main" xmlns:r="http://schemas.openxmlformats.org/officeDocument/2006/relationships">
   <p:cSld>
     <p:bg>

</xml_diff>